<commit_message>
Record button style correct
</commit_message>
<xml_diff>
--- a/MIDI-клавиатура.pptx
+++ b/MIDI-клавиатура.pptx
@@ -109,6 +109,11 @@
       </a:defRPr>
     </a:lvl9pPr>
   </p:defaultTextStyle>
+  <p:extLst>
+    <p:ext uri="{EFAFB233-063F-42B5-8137-9DF3F51BA10A}">
+      <p15:sldGuideLst xmlns:p15="http://schemas.microsoft.com/office/powerpoint/2012/main"/>
+    </p:ext>
+  </p:extLst>
 </p:presentation>
 </file>
 
@@ -325,7 +330,7 @@
           <a:p>
             <a:fld id="{D601BE7F-42D7-4BA6-848E-4328A43EE67C}" type="datetimeFigureOut">
               <a:rPr lang="ru-RU" smtClean="0"/>
-              <a:t>01.11.2021</a:t>
+              <a:t>05.11.2021</a:t>
             </a:fld>
             <a:endParaRPr lang="ru-RU"/>
           </a:p>
@@ -616,7 +621,7 @@
           <a:p>
             <a:fld id="{D601BE7F-42D7-4BA6-848E-4328A43EE67C}" type="datetimeFigureOut">
               <a:rPr lang="ru-RU" smtClean="0"/>
-              <a:t>01.11.2021</a:t>
+              <a:t>05.11.2021</a:t>
             </a:fld>
             <a:endParaRPr lang="ru-RU"/>
           </a:p>
@@ -875,7 +880,7 @@
           <a:p>
             <a:fld id="{D601BE7F-42D7-4BA6-848E-4328A43EE67C}" type="datetimeFigureOut">
               <a:rPr lang="ru-RU" smtClean="0"/>
-              <a:t>01.11.2021</a:t>
+              <a:t>05.11.2021</a:t>
             </a:fld>
             <a:endParaRPr lang="ru-RU"/>
           </a:p>
@@ -1344,7 +1349,7 @@
           <a:p>
             <a:fld id="{D601BE7F-42D7-4BA6-848E-4328A43EE67C}" type="datetimeFigureOut">
               <a:rPr lang="ru-RU" smtClean="0"/>
-              <a:t>01.11.2021</a:t>
+              <a:t>05.11.2021</a:t>
             </a:fld>
             <a:endParaRPr lang="ru-RU"/>
           </a:p>
@@ -1524,7 +1529,7 @@
           <a:p>
             <a:fld id="{D601BE7F-42D7-4BA6-848E-4328A43EE67C}" type="datetimeFigureOut">
               <a:rPr lang="ru-RU" smtClean="0"/>
-              <a:t>01.11.2021</a:t>
+              <a:t>05.11.2021</a:t>
             </a:fld>
             <a:endParaRPr lang="ru-RU"/>
           </a:p>
@@ -2100,7 +2105,7 @@
           <a:p>
             <a:fld id="{D601BE7F-42D7-4BA6-848E-4328A43EE67C}" type="datetimeFigureOut">
               <a:rPr lang="ru-RU" smtClean="0"/>
-              <a:t>01.11.2021</a:t>
+              <a:t>05.11.2021</a:t>
             </a:fld>
             <a:endParaRPr lang="ru-RU"/>
           </a:p>
@@ -2432,7 +2437,7 @@
           <a:p>
             <a:fld id="{D601BE7F-42D7-4BA6-848E-4328A43EE67C}" type="datetimeFigureOut">
               <a:rPr lang="ru-RU" smtClean="0"/>
-              <a:t>01.11.2021</a:t>
+              <a:t>05.11.2021</a:t>
             </a:fld>
             <a:endParaRPr lang="ru-RU"/>
           </a:p>
@@ -2607,7 +2612,7 @@
           <a:p>
             <a:fld id="{D601BE7F-42D7-4BA6-848E-4328A43EE67C}" type="datetimeFigureOut">
               <a:rPr lang="ru-RU" smtClean="0"/>
-              <a:t>01.11.2021</a:t>
+              <a:t>05.11.2021</a:t>
             </a:fld>
             <a:endParaRPr lang="ru-RU"/>
           </a:p>
@@ -2787,7 +2792,7 @@
           <a:p>
             <a:fld id="{D601BE7F-42D7-4BA6-848E-4328A43EE67C}" type="datetimeFigureOut">
               <a:rPr lang="ru-RU" smtClean="0"/>
-              <a:t>01.11.2021</a:t>
+              <a:t>05.11.2021</a:t>
             </a:fld>
             <a:endParaRPr lang="ru-RU"/>
           </a:p>
@@ -2957,7 +2962,7 @@
           <a:p>
             <a:fld id="{D601BE7F-42D7-4BA6-848E-4328A43EE67C}" type="datetimeFigureOut">
               <a:rPr lang="ru-RU" smtClean="0"/>
-              <a:t>01.11.2021</a:t>
+              <a:t>05.11.2021</a:t>
             </a:fld>
             <a:endParaRPr lang="ru-RU"/>
           </a:p>
@@ -3214,7 +3219,7 @@
           <a:p>
             <a:fld id="{D601BE7F-42D7-4BA6-848E-4328A43EE67C}" type="datetimeFigureOut">
               <a:rPr lang="ru-RU" smtClean="0"/>
-              <a:t>01.11.2021</a:t>
+              <a:t>05.11.2021</a:t>
             </a:fld>
             <a:endParaRPr lang="ru-RU"/>
           </a:p>
@@ -3506,7 +3511,7 @@
           <a:p>
             <a:fld id="{D601BE7F-42D7-4BA6-848E-4328A43EE67C}" type="datetimeFigureOut">
               <a:rPr lang="ru-RU" smtClean="0"/>
-              <a:t>01.11.2021</a:t>
+              <a:t>05.11.2021</a:t>
             </a:fld>
             <a:endParaRPr lang="ru-RU"/>
           </a:p>
@@ -3936,7 +3941,7 @@
           <a:p>
             <a:fld id="{D601BE7F-42D7-4BA6-848E-4328A43EE67C}" type="datetimeFigureOut">
               <a:rPr lang="ru-RU" smtClean="0"/>
-              <a:t>01.11.2021</a:t>
+              <a:t>05.11.2021</a:t>
             </a:fld>
             <a:endParaRPr lang="ru-RU"/>
           </a:p>
@@ -4054,7 +4059,7 @@
           <a:p>
             <a:fld id="{D601BE7F-42D7-4BA6-848E-4328A43EE67C}" type="datetimeFigureOut">
               <a:rPr lang="ru-RU" smtClean="0"/>
-              <a:t>01.11.2021</a:t>
+              <a:t>05.11.2021</a:t>
             </a:fld>
             <a:endParaRPr lang="ru-RU"/>
           </a:p>
@@ -4149,7 +4154,7 @@
           <a:p>
             <a:fld id="{D601BE7F-42D7-4BA6-848E-4328A43EE67C}" type="datetimeFigureOut">
               <a:rPr lang="ru-RU" smtClean="0"/>
-              <a:t>01.11.2021</a:t>
+              <a:t>05.11.2021</a:t>
             </a:fld>
             <a:endParaRPr lang="ru-RU"/>
           </a:p>
@@ -4432,7 +4437,7 @@
           <a:p>
             <a:fld id="{D601BE7F-42D7-4BA6-848E-4328A43EE67C}" type="datetimeFigureOut">
               <a:rPr lang="ru-RU" smtClean="0"/>
-              <a:t>01.11.2021</a:t>
+              <a:t>05.11.2021</a:t>
             </a:fld>
             <a:endParaRPr lang="ru-RU"/>
           </a:p>
@@ -4723,7 +4728,7 @@
           <a:p>
             <a:fld id="{D601BE7F-42D7-4BA6-848E-4328A43EE67C}" type="datetimeFigureOut">
               <a:rPr lang="ru-RU" smtClean="0"/>
-              <a:t>01.11.2021</a:t>
+              <a:t>05.11.2021</a:t>
             </a:fld>
             <a:endParaRPr lang="ru-RU"/>
           </a:p>
@@ -4954,7 +4959,7 @@
           <a:p>
             <a:fld id="{D601BE7F-42D7-4BA6-848E-4328A43EE67C}" type="datetimeFigureOut">
               <a:rPr lang="ru-RU" smtClean="0"/>
-              <a:t>01.11.2021</a:t>
+              <a:t>05.11.2021</a:t>
             </a:fld>
             <a:endParaRPr lang="ru-RU"/>
           </a:p>
@@ -5813,7 +5818,12 @@
             <p:ph type="title"/>
           </p:nvPr>
         </p:nvSpPr>
-        <p:spPr/>
+        <p:spPr>
+          <a:xfrm>
+            <a:off x="1141413" y="549215"/>
+            <a:ext cx="9905998" cy="1905000"/>
+          </a:xfrm>
+        </p:spPr>
         <p:txBody>
           <a:bodyPr/>
           <a:lstStyle/>
@@ -5830,32 +5840,61 @@
           </a:p>
         </p:txBody>
       </p:sp>
-      <p:sp>
-        <p:nvSpPr>
-          <p:cNvPr id="3" name="Объект 2"/>
-          <p:cNvSpPr>
-            <a:spLocks noGrp="1"/>
-          </p:cNvSpPr>
-          <p:nvPr>
-            <p:ph idx="1"/>
-          </p:nvPr>
-        </p:nvSpPr>
-        <p:spPr/>
-        <p:txBody>
-          <a:bodyPr/>
+      <p:pic>
+        <p:nvPicPr>
+          <p:cNvPr id="4" name="Рисунок 3"/>
+          <p:cNvPicPr>
+            <a:picLocks noChangeAspect="1"/>
+          </p:cNvPicPr>
+          <p:nvPr/>
+        </p:nvPicPr>
+        <p:blipFill>
+          <a:blip r:embed="rId2">
+            <a:extLst>
+              <a:ext uri="{28A0092B-C50C-407E-A947-70E740481C1C}">
+                <a14:useLocalDpi xmlns:a14="http://schemas.microsoft.com/office/drawing/2010/main" val="0"/>
+              </a:ext>
+            </a:extLst>
+          </a:blip>
+          <a:stretch>
+            <a:fillRect/>
+          </a:stretch>
+        </p:blipFill>
+        <p:spPr>
+          <a:xfrm>
+            <a:off x="1141413" y="2261104"/>
+            <a:ext cx="6797629" cy="3871295"/>
+          </a:xfrm>
+          <a:prstGeom prst="rect">
+            <a:avLst/>
+          </a:prstGeom>
+        </p:spPr>
+      </p:pic>
+      <p:sp>
+        <p:nvSpPr>
+          <p:cNvPr id="5" name="TextBox 4"/>
+          <p:cNvSpPr txBox="1"/>
+          <p:nvPr/>
+        </p:nvSpPr>
+        <p:spPr>
+          <a:xfrm>
+            <a:off x="8712680" y="4012085"/>
+            <a:ext cx="2630848" cy="369332"/>
+          </a:xfrm>
+          <a:prstGeom prst="rect">
+            <a:avLst/>
+          </a:prstGeom>
+          <a:noFill/>
+        </p:spPr>
+        <p:txBody>
+          <a:bodyPr wrap="none" rtlCol="0">
+            <a:spAutoFit/>
+          </a:bodyPr>
           <a:lstStyle/>
           <a:p>
             <a:r>
               <a:rPr lang="ru-RU" dirty="0" smtClean="0"/>
-              <a:t>(</a:t>
-            </a:r>
-            <a:r>
-              <a:rPr lang="ru-RU" dirty="0" err="1" smtClean="0"/>
-              <a:t>Скрин</a:t>
-            </a:r>
-            <a:r>
-              <a:rPr lang="ru-RU" dirty="0" smtClean="0"/>
-              <a:t> основного окна моей клавиатуры)</a:t>
+              <a:t>Вид основного меню</a:t>
             </a:r>
             <a:endParaRPr lang="ru-RU" dirty="0"/>
           </a:p>
@@ -5916,40 +5955,52 @@
       </p:sp>
       <p:sp>
         <p:nvSpPr>
-          <p:cNvPr id="3" name="Объект 2"/>
-          <p:cNvSpPr>
-            <a:spLocks noGrp="1"/>
-          </p:cNvSpPr>
-          <p:nvPr>
-            <p:ph idx="1"/>
-          </p:nvPr>
-        </p:nvSpPr>
-        <p:spPr/>
-        <p:txBody>
-          <a:bodyPr/>
-          <a:lstStyle/>
-          <a:p>
-            <a:r>
-              <a:rPr lang="ru-RU" dirty="0" smtClean="0"/>
-              <a:t>(2 </a:t>
-            </a:r>
-            <a:r>
-              <a:rPr lang="ru-RU" dirty="0" err="1" smtClean="0"/>
-              <a:t>скрина</a:t>
-            </a:r>
-            <a:r>
-              <a:rPr lang="ru-RU" dirty="0" smtClean="0"/>
-              <a:t>: кнопка </a:t>
-            </a:r>
-            <a:r>
-              <a:rPr lang="en-US" dirty="0" smtClean="0"/>
-              <a:t>change sound </a:t>
-            </a:r>
-            <a:r>
-              <a:rPr lang="ru-RU" dirty="0" smtClean="0"/>
-              <a:t>и диалоговое окно, которое она вызывает</a:t>
-            </a:r>
-            <a:endParaRPr lang="ru-RU" dirty="0"/>
+          <p:cNvPr id="5" name="TextBox 4"/>
+          <p:cNvSpPr txBox="1"/>
+          <p:nvPr/>
+        </p:nvSpPr>
+        <p:spPr>
+          <a:xfrm>
+            <a:off x="1141413" y="2514600"/>
+            <a:ext cx="3140603" cy="1384995"/>
+          </a:xfrm>
+          <a:prstGeom prst="rect">
+            <a:avLst/>
+          </a:prstGeom>
+          <a:noFill/>
+        </p:spPr>
+        <p:txBody>
+          <a:bodyPr wrap="none" rtlCol="0">
+            <a:spAutoFit/>
+          </a:bodyPr>
+          <a:lstStyle/>
+          <a:p>
+            <a:pPr marL="342900" indent="-342900">
+              <a:buAutoNum type="arabicPeriod"/>
+            </a:pPr>
+            <a:r>
+              <a:rPr lang="en-US" sz="2800" dirty="0" smtClean="0"/>
+              <a:t>Change sound</a:t>
+            </a:r>
+          </a:p>
+          <a:p>
+            <a:pPr marL="342900" indent="-342900">
+              <a:buAutoNum type="arabicPeriod"/>
+            </a:pPr>
+            <a:r>
+              <a:rPr lang="en-US" sz="2800" dirty="0" smtClean="0"/>
+              <a:t>Record</a:t>
+            </a:r>
+          </a:p>
+          <a:p>
+            <a:pPr marL="342900" indent="-342900">
+              <a:buAutoNum type="arabicPeriod"/>
+            </a:pPr>
+            <a:r>
+              <a:rPr lang="en-US" sz="2800" dirty="0" smtClean="0"/>
+              <a:t>Convert</a:t>
+            </a:r>
+            <a:endParaRPr lang="ru-RU" sz="2800" dirty="0"/>
           </a:p>
         </p:txBody>
       </p:sp>
@@ -5999,44 +6050,107 @@
           <a:lstStyle/>
           <a:p>
             <a:r>
-              <a:rPr lang="ru-RU" dirty="0" smtClean="0"/>
-              <a:t>Использование клавиатуры компьютера</a:t>
+              <a:rPr lang="en-US" dirty="0" smtClean="0"/>
+              <a:t>Change sound</a:t>
             </a:r>
             <a:endParaRPr lang="ru-RU" dirty="0"/>
           </a:p>
         </p:txBody>
       </p:sp>
-      <p:sp>
-        <p:nvSpPr>
-          <p:cNvPr id="3" name="Объект 2"/>
-          <p:cNvSpPr>
-            <a:spLocks noGrp="1"/>
-          </p:cNvSpPr>
-          <p:nvPr>
-            <p:ph idx="1"/>
-          </p:nvPr>
-        </p:nvSpPr>
-        <p:spPr/>
-        <p:txBody>
-          <a:bodyPr/>
-          <a:lstStyle/>
-          <a:p>
-            <a:r>
-              <a:rPr lang="ru-RU" dirty="0" smtClean="0"/>
-              <a:t>Сюда скорее всего вставлю </a:t>
-            </a:r>
-            <a:r>
-              <a:rPr lang="ru-RU" dirty="0" err="1" smtClean="0"/>
-              <a:t>гифку</a:t>
-            </a:r>
-            <a:r>
-              <a:rPr lang="ru-RU" dirty="0" smtClean="0"/>
-              <a:t> с нажатием нот без </a:t>
-            </a:r>
-            <a:r>
-              <a:rPr lang="ru-RU" smtClean="0"/>
-              <a:t>использования мышки</a:t>
-            </a:r>
+      <p:pic>
+        <p:nvPicPr>
+          <p:cNvPr id="5" name="Рисунок 4"/>
+          <p:cNvPicPr>
+            <a:picLocks noChangeAspect="1"/>
+          </p:cNvPicPr>
+          <p:nvPr/>
+        </p:nvPicPr>
+        <p:blipFill>
+          <a:blip r:embed="rId2">
+            <a:extLst>
+              <a:ext uri="{28A0092B-C50C-407E-A947-70E740481C1C}">
+                <a14:useLocalDpi xmlns:a14="http://schemas.microsoft.com/office/drawing/2010/main" val="0"/>
+              </a:ext>
+            </a:extLst>
+          </a:blip>
+          <a:stretch>
+            <a:fillRect/>
+          </a:stretch>
+        </p:blipFill>
+        <p:spPr>
+          <a:xfrm>
+            <a:off x="1141413" y="2938220"/>
+            <a:ext cx="1874682" cy="1844200"/>
+          </a:xfrm>
+          <a:prstGeom prst="rect">
+            <a:avLst/>
+          </a:prstGeom>
+        </p:spPr>
+      </p:pic>
+      <p:pic>
+        <p:nvPicPr>
+          <p:cNvPr id="6" name="Рисунок 5"/>
+          <p:cNvPicPr>
+            <a:picLocks noChangeAspect="1"/>
+          </p:cNvPicPr>
+          <p:nvPr/>
+        </p:nvPicPr>
+        <p:blipFill>
+          <a:blip r:embed="rId3">
+            <a:extLst>
+              <a:ext uri="{28A0092B-C50C-407E-A947-70E740481C1C}">
+                <a14:useLocalDpi xmlns:a14="http://schemas.microsoft.com/office/drawing/2010/main" val="0"/>
+              </a:ext>
+            </a:extLst>
+          </a:blip>
+          <a:stretch>
+            <a:fillRect/>
+          </a:stretch>
+        </p:blipFill>
+        <p:spPr>
+          <a:xfrm>
+            <a:off x="4697566" y="2010840"/>
+            <a:ext cx="7110076" cy="4458086"/>
+          </a:xfrm>
+          <a:prstGeom prst="rect">
+            <a:avLst/>
+          </a:prstGeom>
+        </p:spPr>
+      </p:pic>
+      <p:sp>
+        <p:nvSpPr>
+          <p:cNvPr id="7" name="Стрелка вправо 6"/>
+          <p:cNvSpPr/>
+          <p:nvPr/>
+        </p:nvSpPr>
+        <p:spPr>
+          <a:xfrm>
+            <a:off x="3234906" y="3450566"/>
+            <a:ext cx="1155939" cy="819509"/>
+          </a:xfrm>
+          <a:prstGeom prst="rightArrow">
+            <a:avLst/>
+          </a:prstGeom>
+        </p:spPr>
+        <p:style>
+          <a:lnRef idx="1">
+            <a:schemeClr val="accent2"/>
+          </a:lnRef>
+          <a:fillRef idx="3">
+            <a:schemeClr val="accent2"/>
+          </a:fillRef>
+          <a:effectRef idx="2">
+            <a:schemeClr val="accent2"/>
+          </a:effectRef>
+          <a:fontRef idx="minor">
+            <a:schemeClr val="lt1"/>
+          </a:fontRef>
+        </p:style>
+        <p:txBody>
+          <a:bodyPr rtlCol="0" anchor="ctr"/>
+          <a:lstStyle/>
+          <a:p>
+            <a:pPr algn="ctr"/>
             <a:endParaRPr lang="ru-RU"/>
           </a:p>
         </p:txBody>
@@ -6087,53 +6201,298 @@
           <a:lstStyle/>
           <a:p>
             <a:r>
-              <a:rPr lang="ru-RU" dirty="0" smtClean="0"/>
-              <a:t>Запись</a:t>
+              <a:rPr lang="en-US" dirty="0" smtClean="0"/>
+              <a:t>RECORD</a:t>
             </a:r>
             <a:endParaRPr lang="ru-RU" dirty="0"/>
           </a:p>
         </p:txBody>
       </p:sp>
-      <p:sp>
-        <p:nvSpPr>
-          <p:cNvPr id="3" name="Объект 2"/>
-          <p:cNvSpPr>
-            <a:spLocks noGrp="1"/>
-          </p:cNvSpPr>
-          <p:nvPr>
-            <p:ph idx="1"/>
-          </p:nvPr>
-        </p:nvSpPr>
-        <p:spPr/>
-        <p:txBody>
-          <a:bodyPr/>
-          <a:lstStyle/>
-          <a:p>
-            <a:r>
-              <a:rPr lang="ru-RU" dirty="0" err="1" smtClean="0"/>
-              <a:t>Скрин</a:t>
-            </a:r>
-            <a:r>
-              <a:rPr lang="ru-RU" dirty="0" smtClean="0"/>
-              <a:t> кнопки </a:t>
-            </a:r>
-            <a:r>
-              <a:rPr lang="en-US" dirty="0" smtClean="0"/>
-              <a:t>record</a:t>
-            </a:r>
-            <a:r>
-              <a:rPr lang="ru-RU" dirty="0" smtClean="0"/>
-              <a:t>, окна </a:t>
-            </a:r>
-            <a:r>
-              <a:rPr lang="en-US" dirty="0" smtClean="0"/>
-              <a:t>record preview</a:t>
-            </a:r>
-            <a:r>
-              <a:rPr lang="ru-RU" dirty="0" smtClean="0"/>
-              <a:t> (пока в разработке)</a:t>
-            </a:r>
-            <a:endParaRPr lang="ru-RU" dirty="0"/>
+      <p:pic>
+        <p:nvPicPr>
+          <p:cNvPr id="5" name="Рисунок 4"/>
+          <p:cNvPicPr>
+            <a:picLocks noChangeAspect="1"/>
+          </p:cNvPicPr>
+          <p:nvPr/>
+        </p:nvPicPr>
+        <p:blipFill>
+          <a:blip r:embed="rId2">
+            <a:extLst>
+              <a:ext uri="{28A0092B-C50C-407E-A947-70E740481C1C}">
+                <a14:useLocalDpi xmlns:a14="http://schemas.microsoft.com/office/drawing/2010/main" val="0"/>
+              </a:ext>
+            </a:extLst>
+          </a:blip>
+          <a:stretch>
+            <a:fillRect/>
+          </a:stretch>
+        </p:blipFill>
+        <p:spPr>
+          <a:xfrm>
+            <a:off x="520314" y="1929881"/>
+            <a:ext cx="2238054" cy="1874371"/>
+          </a:xfrm>
+          <a:prstGeom prst="rect">
+            <a:avLst/>
+          </a:prstGeom>
+        </p:spPr>
+      </p:pic>
+      <p:pic>
+        <p:nvPicPr>
+          <p:cNvPr id="6" name="Рисунок 5"/>
+          <p:cNvPicPr>
+            <a:picLocks noChangeAspect="1"/>
+          </p:cNvPicPr>
+          <p:nvPr/>
+        </p:nvPicPr>
+        <p:blipFill>
+          <a:blip r:embed="rId3">
+            <a:extLst>
+              <a:ext uri="{28A0092B-C50C-407E-A947-70E740481C1C}">
+                <a14:useLocalDpi xmlns:a14="http://schemas.microsoft.com/office/drawing/2010/main" val="0"/>
+              </a:ext>
+            </a:extLst>
+          </a:blip>
+          <a:stretch>
+            <a:fillRect/>
+          </a:stretch>
+        </p:blipFill>
+        <p:spPr>
+          <a:xfrm>
+            <a:off x="4082379" y="1929881"/>
+            <a:ext cx="2034102" cy="1874371"/>
+          </a:xfrm>
+          <a:prstGeom prst="rect">
+            <a:avLst/>
+          </a:prstGeom>
+        </p:spPr>
+      </p:pic>
+      <p:sp>
+        <p:nvSpPr>
+          <p:cNvPr id="7" name="Стрелка вправо 6"/>
+          <p:cNvSpPr/>
+          <p:nvPr/>
+        </p:nvSpPr>
+        <p:spPr>
+          <a:xfrm>
+            <a:off x="3027872" y="2553419"/>
+            <a:ext cx="785003" cy="638355"/>
+          </a:xfrm>
+          <a:prstGeom prst="rightArrow">
+            <a:avLst/>
+          </a:prstGeom>
+        </p:spPr>
+        <p:style>
+          <a:lnRef idx="1">
+            <a:schemeClr val="accent2"/>
+          </a:lnRef>
+          <a:fillRef idx="3">
+            <a:schemeClr val="accent2"/>
+          </a:fillRef>
+          <a:effectRef idx="2">
+            <a:schemeClr val="accent2"/>
+          </a:effectRef>
+          <a:fontRef idx="minor">
+            <a:schemeClr val="lt1"/>
+          </a:fontRef>
+        </p:style>
+        <p:txBody>
+          <a:bodyPr rtlCol="0" anchor="ctr"/>
+          <a:lstStyle/>
+          <a:p>
+            <a:pPr algn="ctr"/>
+            <a:endParaRPr lang="ru-RU">
+              <a:solidFill>
+                <a:srgbClr val="FF0000"/>
+              </a:solidFill>
+            </a:endParaRPr>
+          </a:p>
+        </p:txBody>
+      </p:sp>
+      <p:pic>
+        <p:nvPicPr>
+          <p:cNvPr id="8" name="Рисунок 7"/>
+          <p:cNvPicPr>
+            <a:picLocks noChangeAspect="1"/>
+          </p:cNvPicPr>
+          <p:nvPr/>
+        </p:nvPicPr>
+        <p:blipFill>
+          <a:blip r:embed="rId4">
+            <a:extLst>
+              <a:ext uri="{28A0092B-C50C-407E-A947-70E740481C1C}">
+                <a14:useLocalDpi xmlns:a14="http://schemas.microsoft.com/office/drawing/2010/main" val="0"/>
+              </a:ext>
+            </a:extLst>
+          </a:blip>
+          <a:stretch>
+            <a:fillRect/>
+          </a:stretch>
+        </p:blipFill>
+        <p:spPr>
+          <a:xfrm>
+            <a:off x="7440490" y="2322189"/>
+            <a:ext cx="1646063" cy="1089754"/>
+          </a:xfrm>
+          <a:prstGeom prst="rect">
+            <a:avLst/>
+          </a:prstGeom>
+        </p:spPr>
+      </p:pic>
+      <p:sp>
+        <p:nvSpPr>
+          <p:cNvPr id="10" name="Стрелка вправо 9"/>
+          <p:cNvSpPr/>
+          <p:nvPr/>
+        </p:nvSpPr>
+        <p:spPr>
+          <a:xfrm>
+            <a:off x="6385985" y="2553419"/>
+            <a:ext cx="785003" cy="638355"/>
+          </a:xfrm>
+          <a:prstGeom prst="rightArrow">
+            <a:avLst/>
+          </a:prstGeom>
+        </p:spPr>
+        <p:style>
+          <a:lnRef idx="1">
+            <a:schemeClr val="accent2"/>
+          </a:lnRef>
+          <a:fillRef idx="3">
+            <a:schemeClr val="accent2"/>
+          </a:fillRef>
+          <a:effectRef idx="2">
+            <a:schemeClr val="accent2"/>
+          </a:effectRef>
+          <a:fontRef idx="minor">
+            <a:schemeClr val="lt1"/>
+          </a:fontRef>
+        </p:style>
+        <p:txBody>
+          <a:bodyPr rtlCol="0" anchor="ctr"/>
+          <a:lstStyle/>
+          <a:p>
+            <a:pPr algn="ctr"/>
+            <a:endParaRPr lang="ru-RU">
+              <a:solidFill>
+                <a:srgbClr val="FF0000"/>
+              </a:solidFill>
+            </a:endParaRPr>
+          </a:p>
+        </p:txBody>
+      </p:sp>
+      <p:sp>
+        <p:nvSpPr>
+          <p:cNvPr id="11" name="Стрелка вправо 10"/>
+          <p:cNvSpPr/>
+          <p:nvPr/>
+        </p:nvSpPr>
+        <p:spPr>
+          <a:xfrm>
+            <a:off x="9356059" y="2444367"/>
+            <a:ext cx="785003" cy="638355"/>
+          </a:xfrm>
+          <a:prstGeom prst="rightArrow">
+            <a:avLst/>
+          </a:prstGeom>
+        </p:spPr>
+        <p:style>
+          <a:lnRef idx="1">
+            <a:schemeClr val="accent2"/>
+          </a:lnRef>
+          <a:fillRef idx="3">
+            <a:schemeClr val="accent2"/>
+          </a:fillRef>
+          <a:effectRef idx="2">
+            <a:schemeClr val="accent2"/>
+          </a:effectRef>
+          <a:fontRef idx="minor">
+            <a:schemeClr val="lt1"/>
+          </a:fontRef>
+        </p:style>
+        <p:txBody>
+          <a:bodyPr rtlCol="0" anchor="ctr"/>
+          <a:lstStyle/>
+          <a:p>
+            <a:pPr algn="ctr"/>
+            <a:endParaRPr lang="ru-RU">
+              <a:solidFill>
+                <a:srgbClr val="FF0000"/>
+              </a:solidFill>
+            </a:endParaRPr>
+          </a:p>
+        </p:txBody>
+      </p:sp>
+      <p:pic>
+        <p:nvPicPr>
+          <p:cNvPr id="12" name="Рисунок 11"/>
+          <p:cNvPicPr>
+            <a:picLocks noChangeAspect="1"/>
+          </p:cNvPicPr>
+          <p:nvPr/>
+        </p:nvPicPr>
+        <p:blipFill>
+          <a:blip r:embed="rId5">
+            <a:extLst>
+              <a:ext uri="{28A0092B-C50C-407E-A947-70E740481C1C}">
+                <a14:useLocalDpi xmlns:a14="http://schemas.microsoft.com/office/drawing/2010/main" val="0"/>
+              </a:ext>
+            </a:extLst>
+          </a:blip>
+          <a:stretch>
+            <a:fillRect/>
+          </a:stretch>
+        </p:blipFill>
+        <p:spPr>
+          <a:xfrm>
+            <a:off x="3381003" y="4028536"/>
+            <a:ext cx="5426818" cy="2630579"/>
+          </a:xfrm>
+          <a:prstGeom prst="rect">
+            <a:avLst/>
+          </a:prstGeom>
+        </p:spPr>
+      </p:pic>
+      <p:sp>
+        <p:nvSpPr>
+          <p:cNvPr id="13" name="Стрелка вправо 12"/>
+          <p:cNvSpPr/>
+          <p:nvPr/>
+        </p:nvSpPr>
+        <p:spPr>
+          <a:xfrm>
+            <a:off x="1973365" y="5024647"/>
+            <a:ext cx="785003" cy="638355"/>
+          </a:xfrm>
+          <a:prstGeom prst="rightArrow">
+            <a:avLst/>
+          </a:prstGeom>
+        </p:spPr>
+        <p:style>
+          <a:lnRef idx="1">
+            <a:schemeClr val="accent2"/>
+          </a:lnRef>
+          <a:fillRef idx="3">
+            <a:schemeClr val="accent2"/>
+          </a:fillRef>
+          <a:effectRef idx="2">
+            <a:schemeClr val="accent2"/>
+          </a:effectRef>
+          <a:fontRef idx="minor">
+            <a:schemeClr val="lt1"/>
+          </a:fontRef>
+        </p:style>
+        <p:txBody>
+          <a:bodyPr rtlCol="0" anchor="ctr"/>
+          <a:lstStyle/>
+          <a:p>
+            <a:pPr algn="ctr"/>
+            <a:endParaRPr lang="ru-RU">
+              <a:solidFill>
+                <a:srgbClr val="FF0000"/>
+              </a:solidFill>
+            </a:endParaRPr>
           </a:p>
         </p:txBody>
       </p:sp>
@@ -6183,48 +6542,187 @@
           <a:lstStyle/>
           <a:p>
             <a:r>
-              <a:rPr lang="ru-RU" dirty="0" smtClean="0"/>
-              <a:t>Конвертация в музыкальный файл</a:t>
-            </a:r>
-            <a:endParaRPr lang="ru-RU" dirty="0"/>
-          </a:p>
-        </p:txBody>
-      </p:sp>
-      <p:sp>
-        <p:nvSpPr>
-          <p:cNvPr id="3" name="Объект 2"/>
-          <p:cNvSpPr>
-            <a:spLocks noGrp="1"/>
-          </p:cNvSpPr>
-          <p:nvPr>
-            <p:ph idx="1"/>
-          </p:nvPr>
-        </p:nvSpPr>
-        <p:spPr/>
-        <p:txBody>
-          <a:bodyPr/>
-          <a:lstStyle/>
-          <a:p>
-            <a:r>
-              <a:rPr lang="ru-RU" dirty="0" err="1" smtClean="0"/>
-              <a:t>Скрин</a:t>
-            </a:r>
-            <a:r>
-              <a:rPr lang="ru-RU" dirty="0" smtClean="0"/>
-              <a:t> кнопки </a:t>
-            </a:r>
-            <a:r>
               <a:rPr lang="en-US" dirty="0" smtClean="0"/>
               <a:t>Convert</a:t>
             </a:r>
-            <a:r>
-              <a:rPr lang="ru-RU" dirty="0" smtClean="0"/>
-              <a:t>, ее диалогового окна, конечного файла (в разработке)</a:t>
-            </a:r>
             <a:endParaRPr lang="ru-RU" dirty="0"/>
           </a:p>
         </p:txBody>
       </p:sp>
+      <p:pic>
+        <p:nvPicPr>
+          <p:cNvPr id="5" name="Рисунок 4"/>
+          <p:cNvPicPr>
+            <a:picLocks noChangeAspect="1"/>
+          </p:cNvPicPr>
+          <p:nvPr/>
+        </p:nvPicPr>
+        <p:blipFill>
+          <a:blip r:embed="rId2">
+            <a:extLst>
+              <a:ext uri="{28A0092B-C50C-407E-A947-70E740481C1C}">
+                <a14:useLocalDpi xmlns:a14="http://schemas.microsoft.com/office/drawing/2010/main" val="0"/>
+              </a:ext>
+            </a:extLst>
+          </a:blip>
+          <a:stretch>
+            <a:fillRect/>
+          </a:stretch>
+        </p:blipFill>
+        <p:spPr>
+          <a:xfrm>
+            <a:off x="689325" y="2514600"/>
+            <a:ext cx="1600339" cy="1928027"/>
+          </a:xfrm>
+          <a:prstGeom prst="rect">
+            <a:avLst/>
+          </a:prstGeom>
+        </p:spPr>
+      </p:pic>
+      <p:sp>
+        <p:nvSpPr>
+          <p:cNvPr id="6" name="Стрелка вправо 5"/>
+          <p:cNvSpPr/>
+          <p:nvPr/>
+        </p:nvSpPr>
+        <p:spPr>
+          <a:xfrm>
+            <a:off x="2432649" y="3159436"/>
+            <a:ext cx="785003" cy="638355"/>
+          </a:xfrm>
+          <a:prstGeom prst="rightArrow">
+            <a:avLst/>
+          </a:prstGeom>
+        </p:spPr>
+        <p:style>
+          <a:lnRef idx="1">
+            <a:schemeClr val="accent2"/>
+          </a:lnRef>
+          <a:fillRef idx="3">
+            <a:schemeClr val="accent2"/>
+          </a:fillRef>
+          <a:effectRef idx="2">
+            <a:schemeClr val="accent2"/>
+          </a:effectRef>
+          <a:fontRef idx="minor">
+            <a:schemeClr val="lt1"/>
+          </a:fontRef>
+        </p:style>
+        <p:txBody>
+          <a:bodyPr rtlCol="0" anchor="ctr"/>
+          <a:lstStyle/>
+          <a:p>
+            <a:pPr algn="ctr"/>
+            <a:endParaRPr lang="ru-RU">
+              <a:solidFill>
+                <a:srgbClr val="FF0000"/>
+              </a:solidFill>
+            </a:endParaRPr>
+          </a:p>
+        </p:txBody>
+      </p:sp>
+      <p:pic>
+        <p:nvPicPr>
+          <p:cNvPr id="7" name="Рисунок 6"/>
+          <p:cNvPicPr>
+            <a:picLocks noChangeAspect="1"/>
+          </p:cNvPicPr>
+          <p:nvPr/>
+        </p:nvPicPr>
+        <p:blipFill>
+          <a:blip r:embed="rId3">
+            <a:extLst>
+              <a:ext uri="{28A0092B-C50C-407E-A947-70E740481C1C}">
+                <a14:useLocalDpi xmlns:a14="http://schemas.microsoft.com/office/drawing/2010/main" val="0"/>
+              </a:ext>
+            </a:extLst>
+          </a:blip>
+          <a:stretch>
+            <a:fillRect/>
+          </a:stretch>
+        </p:blipFill>
+        <p:spPr>
+          <a:xfrm>
+            <a:off x="3360637" y="2025401"/>
+            <a:ext cx="4085407" cy="2906425"/>
+          </a:xfrm>
+          <a:prstGeom prst="rect">
+            <a:avLst/>
+          </a:prstGeom>
+        </p:spPr>
+      </p:pic>
+      <p:sp>
+        <p:nvSpPr>
+          <p:cNvPr id="8" name="Стрелка вправо 7"/>
+          <p:cNvSpPr/>
+          <p:nvPr/>
+        </p:nvSpPr>
+        <p:spPr>
+          <a:xfrm>
+            <a:off x="7589029" y="3159436"/>
+            <a:ext cx="785003" cy="638355"/>
+          </a:xfrm>
+          <a:prstGeom prst="rightArrow">
+            <a:avLst/>
+          </a:prstGeom>
+        </p:spPr>
+        <p:style>
+          <a:lnRef idx="1">
+            <a:schemeClr val="accent2"/>
+          </a:lnRef>
+          <a:fillRef idx="3">
+            <a:schemeClr val="accent2"/>
+          </a:fillRef>
+          <a:effectRef idx="2">
+            <a:schemeClr val="accent2"/>
+          </a:effectRef>
+          <a:fontRef idx="minor">
+            <a:schemeClr val="lt1"/>
+          </a:fontRef>
+        </p:style>
+        <p:txBody>
+          <a:bodyPr rtlCol="0" anchor="ctr"/>
+          <a:lstStyle/>
+          <a:p>
+            <a:pPr algn="ctr"/>
+            <a:endParaRPr lang="ru-RU">
+              <a:solidFill>
+                <a:srgbClr val="FF0000"/>
+              </a:solidFill>
+            </a:endParaRPr>
+          </a:p>
+        </p:txBody>
+      </p:sp>
+      <p:pic>
+        <p:nvPicPr>
+          <p:cNvPr id="9" name="Рисунок 8"/>
+          <p:cNvPicPr>
+            <a:picLocks noChangeAspect="1"/>
+          </p:cNvPicPr>
+          <p:nvPr/>
+        </p:nvPicPr>
+        <p:blipFill>
+          <a:blip r:embed="rId4">
+            <a:extLst>
+              <a:ext uri="{28A0092B-C50C-407E-A947-70E740481C1C}">
+                <a14:useLocalDpi xmlns:a14="http://schemas.microsoft.com/office/drawing/2010/main" val="0"/>
+              </a:ext>
+            </a:extLst>
+          </a:blip>
+          <a:stretch>
+            <a:fillRect/>
+          </a:stretch>
+        </p:blipFill>
+        <p:spPr>
+          <a:xfrm>
+            <a:off x="8853667" y="2941356"/>
+            <a:ext cx="1623201" cy="1074513"/>
+          </a:xfrm>
+          <a:prstGeom prst="rect">
+            <a:avLst/>
+          </a:prstGeom>
+        </p:spPr>
+      </p:pic>
     </p:spTree>
     <p:extLst>
       <p:ext uri="{BB962C8B-B14F-4D97-AF65-F5344CB8AC3E}">

</xml_diff>